<commit_message>
do not support pptx
</commit_message>
<xml_diff>
--- a/Git使用教程.pptx
+++ b/Git使用教程.pptx
@@ -3142,6 +3142,33 @@
             </a:r>
             <a:endParaRPr lang="zh-CN" altLang="en-US"/>
           </a:p>
+          <a:p>
+            <a:r>
+              <a:rPr lang="en-US" altLang="zh-CN"/>
+              <a:t>Git</a:t>
+            </a:r>
+            <a:r>
+              <a:rPr lang="zh-CN" altLang="zh-CN"/>
+              <a:t>与</a:t>
+            </a:r>
+            <a:r>
+              <a:rPr lang="en-US" altLang="zh-CN"/>
+              <a:t>CVS</a:t>
+            </a:r>
+            <a:r>
+              <a:rPr lang="zh-CN" altLang="en-US"/>
+              <a:t>、</a:t>
+            </a:r>
+            <a:r>
+              <a:rPr lang="en-US" altLang="zh-CN"/>
+              <a:t>SVN</a:t>
+            </a:r>
+            <a:r>
+              <a:rPr lang="zh-CN" altLang="en-US"/>
+              <a:t>的主要区别是分布式与集中式的区别。</a:t>
+            </a:r>
+            <a:endParaRPr lang="zh-CN" altLang="en-US"/>
+          </a:p>
         </p:txBody>
       </p:sp>
     </p:spTree>

</xml_diff>